<commit_message>
Changed actors to a more simplified model.  Updated capability statements to fix #185.
</commit_message>
<xml_diff>
--- a/input/images-source/Images.pptx
+++ b/input/images-source/Images.pptx
@@ -8,6 +8,7 @@
   <p:sldIdLst>
     <p:sldId id="265" r:id="rId3"/>
     <p:sldId id="266" r:id="rId4"/>
+    <p:sldId id="267" r:id="rId5"/>
   </p:sldIdLst>
   <p:sldSz cx="12192000" cy="6858000"/>
   <p:notesSz cx="6858000" cy="9144000"/>
@@ -261,7 +262,7 @@
           <a:p>
             <a:fld id="{6C23B2A9-562B-4498-A095-68B84EBBCBCB}" type="datetimeFigureOut">
               <a:rPr lang="en-US" smtClean="0"/>
-              <a:t>2/10/2022</a:t>
+              <a:t>2/26/2025</a:t>
             </a:fld>
             <a:endParaRPr lang="en-US"/>
           </a:p>
@@ -459,7 +460,7 @@
           <a:p>
             <a:fld id="{6C23B2A9-562B-4498-A095-68B84EBBCBCB}" type="datetimeFigureOut">
               <a:rPr lang="en-US" smtClean="0"/>
-              <a:t>2/10/2022</a:t>
+              <a:t>2/26/2025</a:t>
             </a:fld>
             <a:endParaRPr lang="en-US"/>
           </a:p>
@@ -667,7 +668,7 @@
           <a:p>
             <a:fld id="{6C23B2A9-562B-4498-A095-68B84EBBCBCB}" type="datetimeFigureOut">
               <a:rPr lang="en-US" smtClean="0"/>
-              <a:t>2/10/2022</a:t>
+              <a:t>2/26/2025</a:t>
             </a:fld>
             <a:endParaRPr lang="en-US"/>
           </a:p>
@@ -919,7 +920,7 @@
           <a:p>
             <a:fld id="{2ECE45E5-9F09-47AC-A878-A6A6A2DC413F}" type="datetimeFigureOut">
               <a:rPr lang="en-US" smtClean="0"/>
-              <a:t>2/10/2022</a:t>
+              <a:t>2/26/2025</a:t>
             </a:fld>
             <a:endParaRPr lang="en-US"/>
           </a:p>
@@ -1087,7 +1088,7 @@
           <a:p>
             <a:fld id="{2ECE45E5-9F09-47AC-A878-A6A6A2DC413F}" type="datetimeFigureOut">
               <a:rPr lang="en-US" smtClean="0"/>
-              <a:t>2/10/2022</a:t>
+              <a:t>2/26/2025</a:t>
             </a:fld>
             <a:endParaRPr lang="en-US"/>
           </a:p>
@@ -1332,7 +1333,7 @@
           <a:p>
             <a:fld id="{2ECE45E5-9F09-47AC-A878-A6A6A2DC413F}" type="datetimeFigureOut">
               <a:rPr lang="en-US" smtClean="0"/>
-              <a:t>2/10/2022</a:t>
+              <a:t>2/26/2025</a:t>
             </a:fld>
             <a:endParaRPr lang="en-US"/>
           </a:p>
@@ -1617,7 +1618,7 @@
           <a:p>
             <a:fld id="{2ECE45E5-9F09-47AC-A878-A6A6A2DC413F}" type="datetimeFigureOut">
               <a:rPr lang="en-US" smtClean="0"/>
-              <a:t>2/10/2022</a:t>
+              <a:t>2/26/2025</a:t>
             </a:fld>
             <a:endParaRPr lang="en-US"/>
           </a:p>
@@ -2036,7 +2037,7 @@
           <a:p>
             <a:fld id="{2ECE45E5-9F09-47AC-A878-A6A6A2DC413F}" type="datetimeFigureOut">
               <a:rPr lang="en-US" smtClean="0"/>
-              <a:t>2/10/2022</a:t>
+              <a:t>2/26/2025</a:t>
             </a:fld>
             <a:endParaRPr lang="en-US"/>
           </a:p>
@@ -2153,7 +2154,7 @@
           <a:p>
             <a:fld id="{2ECE45E5-9F09-47AC-A878-A6A6A2DC413F}" type="datetimeFigureOut">
               <a:rPr lang="en-US" smtClean="0"/>
-              <a:t>2/10/2022</a:t>
+              <a:t>2/26/2025</a:t>
             </a:fld>
             <a:endParaRPr lang="en-US"/>
           </a:p>
@@ -2248,7 +2249,7 @@
           <a:p>
             <a:fld id="{2ECE45E5-9F09-47AC-A878-A6A6A2DC413F}" type="datetimeFigureOut">
               <a:rPr lang="en-US" smtClean="0"/>
-              <a:t>2/10/2022</a:t>
+              <a:t>2/26/2025</a:t>
             </a:fld>
             <a:endParaRPr lang="en-US"/>
           </a:p>
@@ -2523,7 +2524,7 @@
           <a:p>
             <a:fld id="{2ECE45E5-9F09-47AC-A878-A6A6A2DC413F}" type="datetimeFigureOut">
               <a:rPr lang="en-US" smtClean="0"/>
-              <a:t>2/10/2022</a:t>
+              <a:t>2/26/2025</a:t>
             </a:fld>
             <a:endParaRPr lang="en-US"/>
           </a:p>
@@ -2709,7 +2710,7 @@
           <a:p>
             <a:fld id="{6C23B2A9-562B-4498-A095-68B84EBBCBCB}" type="datetimeFigureOut">
               <a:rPr lang="en-US" smtClean="0"/>
-              <a:t>2/10/2022</a:t>
+              <a:t>2/26/2025</a:t>
             </a:fld>
             <a:endParaRPr lang="en-US"/>
           </a:p>
@@ -2973,7 +2974,7 @@
           <a:p>
             <a:fld id="{2ECE45E5-9F09-47AC-A878-A6A6A2DC413F}" type="datetimeFigureOut">
               <a:rPr lang="en-US" smtClean="0"/>
-              <a:t>2/10/2022</a:t>
+              <a:t>2/26/2025</a:t>
             </a:fld>
             <a:endParaRPr lang="en-US"/>
           </a:p>
@@ -3141,7 +3142,7 @@
           <a:p>
             <a:fld id="{2ECE45E5-9F09-47AC-A878-A6A6A2DC413F}" type="datetimeFigureOut">
               <a:rPr lang="en-US" smtClean="0"/>
-              <a:t>2/10/2022</a:t>
+              <a:t>2/26/2025</a:t>
             </a:fld>
             <a:endParaRPr lang="en-US"/>
           </a:p>
@@ -3319,7 +3320,7 @@
           <a:p>
             <a:fld id="{2ECE45E5-9F09-47AC-A878-A6A6A2DC413F}" type="datetimeFigureOut">
               <a:rPr lang="en-US" smtClean="0"/>
-              <a:t>2/10/2022</a:t>
+              <a:t>2/26/2025</a:t>
             </a:fld>
             <a:endParaRPr lang="en-US"/>
           </a:p>
@@ -3582,7 +3583,7 @@
           <a:p>
             <a:fld id="{6C23B2A9-562B-4498-A095-68B84EBBCBCB}" type="datetimeFigureOut">
               <a:rPr lang="en-US" smtClean="0"/>
-              <a:t>2/10/2022</a:t>
+              <a:t>2/26/2025</a:t>
             </a:fld>
             <a:endParaRPr lang="en-US"/>
           </a:p>
@@ -3847,7 +3848,7 @@
           <a:p>
             <a:fld id="{6C23B2A9-562B-4498-A095-68B84EBBCBCB}" type="datetimeFigureOut">
               <a:rPr lang="en-US" smtClean="0"/>
-              <a:t>2/10/2022</a:t>
+              <a:t>2/26/2025</a:t>
             </a:fld>
             <a:endParaRPr lang="en-US"/>
           </a:p>
@@ -4259,7 +4260,7 @@
           <a:p>
             <a:fld id="{6C23B2A9-562B-4498-A095-68B84EBBCBCB}" type="datetimeFigureOut">
               <a:rPr lang="en-US" smtClean="0"/>
-              <a:t>2/10/2022</a:t>
+              <a:t>2/26/2025</a:t>
             </a:fld>
             <a:endParaRPr lang="en-US"/>
           </a:p>
@@ -4400,7 +4401,7 @@
           <a:p>
             <a:fld id="{6C23B2A9-562B-4498-A095-68B84EBBCBCB}" type="datetimeFigureOut">
               <a:rPr lang="en-US" smtClean="0"/>
-              <a:t>2/10/2022</a:t>
+              <a:t>2/26/2025</a:t>
             </a:fld>
             <a:endParaRPr lang="en-US"/>
           </a:p>
@@ -4513,7 +4514,7 @@
           <a:p>
             <a:fld id="{6C23B2A9-562B-4498-A095-68B84EBBCBCB}" type="datetimeFigureOut">
               <a:rPr lang="en-US" smtClean="0"/>
-              <a:t>2/10/2022</a:t>
+              <a:t>2/26/2025</a:t>
             </a:fld>
             <a:endParaRPr lang="en-US"/>
           </a:p>
@@ -4824,7 +4825,7 @@
           <a:p>
             <a:fld id="{6C23B2A9-562B-4498-A095-68B84EBBCBCB}" type="datetimeFigureOut">
               <a:rPr lang="en-US" smtClean="0"/>
-              <a:t>2/10/2022</a:t>
+              <a:t>2/26/2025</a:t>
             </a:fld>
             <a:endParaRPr lang="en-US"/>
           </a:p>
@@ -5112,7 +5113,7 @@
           <a:p>
             <a:fld id="{6C23B2A9-562B-4498-A095-68B84EBBCBCB}" type="datetimeFigureOut">
               <a:rPr lang="en-US" smtClean="0"/>
-              <a:t>2/10/2022</a:t>
+              <a:t>2/26/2025</a:t>
             </a:fld>
             <a:endParaRPr lang="en-US"/>
           </a:p>
@@ -5353,7 +5354,7 @@
           <a:p>
             <a:fld id="{6C23B2A9-562B-4498-A095-68B84EBBCBCB}" type="datetimeFigureOut">
               <a:rPr lang="en-US" smtClean="0"/>
-              <a:t>2/10/2022</a:t>
+              <a:t>2/26/2025</a:t>
             </a:fld>
             <a:endParaRPr lang="en-US"/>
           </a:p>
@@ -5903,7 +5904,7 @@
           <a:p>
             <a:fld id="{2ECE45E5-9F09-47AC-A878-A6A6A2DC413F}" type="datetimeFigureOut">
               <a:rPr lang="en-US" smtClean="0"/>
-              <a:t>2/10/2022</a:t>
+              <a:t>2/26/2025</a:t>
             </a:fld>
             <a:endParaRPr lang="en-US"/>
           </a:p>
@@ -12416,6 +12417,1967 @@
 </p:sld>
 </file>
 
+<file path=ppt/slides/slide3.xml><?xml version="1.0" encoding="utf-8"?>
+<p:sld xmlns:a="http://schemas.openxmlformats.org/drawingml/2006/main" xmlns:r="http://schemas.openxmlformats.org/officeDocument/2006/relationships" xmlns:p="http://schemas.openxmlformats.org/presentationml/2006/main">
+  <p:cSld>
+    <p:spTree>
+      <p:nvGrpSpPr>
+        <p:cNvPr id="1" name="">
+          <a:extLst>
+            <a:ext uri="{FF2B5EF4-FFF2-40B4-BE49-F238E27FC236}">
+              <a16:creationId xmlns:a16="http://schemas.microsoft.com/office/drawing/2014/main" id="{22FCAE54-91C9-A6E3-D581-5B7661624549}"/>
+            </a:ext>
+          </a:extLst>
+        </p:cNvPr>
+        <p:cNvGrpSpPr/>
+        <p:nvPr/>
+      </p:nvGrpSpPr>
+      <p:grpSpPr>
+        <a:xfrm>
+          <a:off x="0" y="0"/>
+          <a:ext cx="0" cy="0"/>
+          <a:chOff x="0" y="0"/>
+          <a:chExt cx="0" cy="0"/>
+        </a:xfrm>
+      </p:grpSpPr>
+      <p:sp>
+        <p:nvSpPr>
+          <p:cNvPr id="18" name="Rectangle 17">
+            <a:extLst>
+              <a:ext uri="{FF2B5EF4-FFF2-40B4-BE49-F238E27FC236}">
+                <a16:creationId xmlns:a16="http://schemas.microsoft.com/office/drawing/2014/main" id="{3F02B6D0-37C1-E9C4-E71D-D00229454F24}"/>
+              </a:ext>
+            </a:extLst>
+          </p:cNvPr>
+          <p:cNvSpPr/>
+          <p:nvPr/>
+        </p:nvSpPr>
+        <p:spPr>
+          <a:xfrm>
+            <a:off x="1524000" y="2221694"/>
+            <a:ext cx="5410200" cy="3569507"/>
+          </a:xfrm>
+          <a:prstGeom prst="rect">
+            <a:avLst/>
+          </a:prstGeom>
+          <a:solidFill>
+            <a:schemeClr val="bg1"/>
+          </a:solidFill>
+          <a:ln>
+            <a:solidFill>
+              <a:schemeClr val="tx1"/>
+            </a:solidFill>
+            <a:prstDash val="dash"/>
+          </a:ln>
+        </p:spPr>
+        <p:style>
+          <a:lnRef idx="2">
+            <a:schemeClr val="accent1">
+              <a:shade val="50000"/>
+            </a:schemeClr>
+          </a:lnRef>
+          <a:fillRef idx="1">
+            <a:schemeClr val="accent1"/>
+          </a:fillRef>
+          <a:effectRef idx="0">
+            <a:schemeClr val="accent1"/>
+          </a:effectRef>
+          <a:fontRef idx="minor">
+            <a:schemeClr val="lt1"/>
+          </a:fontRef>
+        </p:style>
+        <p:txBody>
+          <a:bodyPr rtlCol="0" anchor="t" anchorCtr="0"/>
+          <a:lstStyle/>
+          <a:p>
+            <a:pPr algn="ctr"/>
+            <a:r>
+              <a:rPr lang="en-US" sz="1200" dirty="0">
+                <a:solidFill>
+                  <a:prstClr val="black"/>
+                </a:solidFill>
+                <a:latin typeface="Calibri"/>
+              </a:rPr>
+              <a:t>Country Jurisdiction</a:t>
+            </a:r>
+          </a:p>
+        </p:txBody>
+      </p:sp>
+      <p:sp>
+        <p:nvSpPr>
+          <p:cNvPr id="59" name="Rectangle 58">
+            <a:extLst>
+              <a:ext uri="{FF2B5EF4-FFF2-40B4-BE49-F238E27FC236}">
+                <a16:creationId xmlns:a16="http://schemas.microsoft.com/office/drawing/2014/main" id="{BC9F1D78-DBBF-9C36-DA57-30B7F0D4137E}"/>
+              </a:ext>
+            </a:extLst>
+          </p:cNvPr>
+          <p:cNvSpPr/>
+          <p:nvPr/>
+        </p:nvSpPr>
+        <p:spPr>
+          <a:xfrm>
+            <a:off x="3352800" y="152400"/>
+            <a:ext cx="4202830" cy="3886200"/>
+          </a:xfrm>
+          <a:prstGeom prst="rect">
+            <a:avLst/>
+          </a:prstGeom>
+          <a:solidFill>
+            <a:schemeClr val="bg1">
+              <a:alpha val="0"/>
+            </a:schemeClr>
+          </a:solidFill>
+          <a:ln>
+            <a:solidFill>
+              <a:schemeClr val="tx1"/>
+            </a:solidFill>
+            <a:prstDash val="dash"/>
+          </a:ln>
+        </p:spPr>
+        <p:style>
+          <a:lnRef idx="2">
+            <a:schemeClr val="accent1">
+              <a:shade val="50000"/>
+            </a:schemeClr>
+          </a:lnRef>
+          <a:fillRef idx="1">
+            <a:schemeClr val="accent1"/>
+          </a:fillRef>
+          <a:effectRef idx="0">
+            <a:schemeClr val="accent1"/>
+          </a:effectRef>
+          <a:fontRef idx="minor">
+            <a:schemeClr val="lt1"/>
+          </a:fontRef>
+        </p:style>
+        <p:txBody>
+          <a:bodyPr rtlCol="0" anchor="t" anchorCtr="0"/>
+          <a:lstStyle/>
+          <a:p>
+            <a:pPr algn="ctr"/>
+            <a:r>
+              <a:rPr lang="en-US" sz="1400" dirty="0">
+                <a:solidFill>
+                  <a:prstClr val="black"/>
+                </a:solidFill>
+                <a:latin typeface="Calibri"/>
+              </a:rPr>
+              <a:t>Global Jurisdiction</a:t>
+            </a:r>
+          </a:p>
+        </p:txBody>
+      </p:sp>
+      <p:sp>
+        <p:nvSpPr>
+          <p:cNvPr id="76" name="Rectangle 75">
+            <a:extLst>
+              <a:ext uri="{FF2B5EF4-FFF2-40B4-BE49-F238E27FC236}">
+                <a16:creationId xmlns:a16="http://schemas.microsoft.com/office/drawing/2014/main" id="{FF367060-B40C-2CFA-545F-53D7FBA9BD3F}"/>
+              </a:ext>
+            </a:extLst>
+          </p:cNvPr>
+          <p:cNvSpPr/>
+          <p:nvPr/>
+        </p:nvSpPr>
+        <p:spPr>
+          <a:xfrm>
+            <a:off x="2209800" y="152400"/>
+            <a:ext cx="1143000" cy="1943100"/>
+          </a:xfrm>
+          <a:prstGeom prst="rect">
+            <a:avLst/>
+          </a:prstGeom>
+          <a:solidFill>
+            <a:schemeClr val="bg1"/>
+          </a:solidFill>
+          <a:ln>
+            <a:solidFill>
+              <a:schemeClr val="tx1"/>
+            </a:solidFill>
+            <a:prstDash val="dash"/>
+          </a:ln>
+        </p:spPr>
+        <p:style>
+          <a:lnRef idx="2">
+            <a:schemeClr val="accent1">
+              <a:shade val="50000"/>
+            </a:schemeClr>
+          </a:lnRef>
+          <a:fillRef idx="1">
+            <a:schemeClr val="accent1"/>
+          </a:fillRef>
+          <a:effectRef idx="0">
+            <a:schemeClr val="accent1"/>
+          </a:effectRef>
+          <a:fontRef idx="minor">
+            <a:schemeClr val="lt1"/>
+          </a:fontRef>
+        </p:style>
+        <p:txBody>
+          <a:bodyPr rtlCol="0" anchor="ctr"/>
+          <a:lstStyle/>
+          <a:p>
+            <a:pPr algn="ctr"/>
+            <a:endParaRPr lang="en-US">
+              <a:solidFill>
+                <a:prstClr val="white"/>
+              </a:solidFill>
+              <a:latin typeface="Calibri"/>
+            </a:endParaRPr>
+          </a:p>
+        </p:txBody>
+      </p:sp>
+      <p:sp>
+        <p:nvSpPr>
+          <p:cNvPr id="77" name="Rectangle 76">
+            <a:extLst>
+              <a:ext uri="{FF2B5EF4-FFF2-40B4-BE49-F238E27FC236}">
+                <a16:creationId xmlns:a16="http://schemas.microsoft.com/office/drawing/2014/main" id="{CB03D745-33BA-61ED-30AB-D43FC0F0C38F}"/>
+              </a:ext>
+            </a:extLst>
+          </p:cNvPr>
+          <p:cNvSpPr/>
+          <p:nvPr/>
+        </p:nvSpPr>
+        <p:spPr>
+          <a:xfrm>
+            <a:off x="3307080" y="182880"/>
+            <a:ext cx="91440" cy="1883664"/>
+          </a:xfrm>
+          <a:prstGeom prst="rect">
+            <a:avLst/>
+          </a:prstGeom>
+          <a:solidFill>
+            <a:schemeClr val="bg1"/>
+          </a:solidFill>
+          <a:ln>
+            <a:solidFill>
+              <a:schemeClr val="bg1"/>
+            </a:solidFill>
+          </a:ln>
+        </p:spPr>
+        <p:style>
+          <a:lnRef idx="2">
+            <a:schemeClr val="accent1">
+              <a:shade val="50000"/>
+            </a:schemeClr>
+          </a:lnRef>
+          <a:fillRef idx="1">
+            <a:schemeClr val="accent1"/>
+          </a:fillRef>
+          <a:effectRef idx="0">
+            <a:schemeClr val="accent1"/>
+          </a:effectRef>
+          <a:fontRef idx="minor">
+            <a:schemeClr val="lt1"/>
+          </a:fontRef>
+        </p:style>
+        <p:txBody>
+          <a:bodyPr rtlCol="0" anchor="ctr"/>
+          <a:lstStyle/>
+          <a:p>
+            <a:pPr algn="ctr"/>
+            <a:endParaRPr lang="en-US">
+              <a:solidFill>
+                <a:prstClr val="white"/>
+              </a:solidFill>
+              <a:latin typeface="Calibri"/>
+            </a:endParaRPr>
+          </a:p>
+        </p:txBody>
+      </p:sp>
+      <p:grpSp>
+        <p:nvGrpSpPr>
+          <p:cNvPr id="15" name="Group 14">
+            <a:extLst>
+              <a:ext uri="{FF2B5EF4-FFF2-40B4-BE49-F238E27FC236}">
+                <a16:creationId xmlns:a16="http://schemas.microsoft.com/office/drawing/2014/main" id="{860B5A71-A1A6-0AC0-C8F2-180233618D6C}"/>
+              </a:ext>
+            </a:extLst>
+          </p:cNvPr>
+          <p:cNvGrpSpPr/>
+          <p:nvPr/>
+        </p:nvGrpSpPr>
+        <p:grpSpPr>
+          <a:xfrm>
+            <a:off x="2481445" y="245340"/>
+            <a:ext cx="4923422" cy="1481679"/>
+            <a:chOff x="654884" y="1025973"/>
+            <a:chExt cx="6344674" cy="1909397"/>
+          </a:xfrm>
+          <a:solidFill>
+            <a:schemeClr val="bg1"/>
+          </a:solidFill>
+        </p:grpSpPr>
+        <p:sp>
+          <p:nvSpPr>
+            <p:cNvPr id="6" name="Rectangle 5">
+              <a:extLst>
+                <a:ext uri="{FF2B5EF4-FFF2-40B4-BE49-F238E27FC236}">
+                  <a16:creationId xmlns:a16="http://schemas.microsoft.com/office/drawing/2014/main" id="{C2DA22D0-EA9E-0D74-1322-37DC607BE902}"/>
+                </a:ext>
+              </a:extLst>
+            </p:cNvPr>
+            <p:cNvSpPr/>
+            <p:nvPr/>
+          </p:nvSpPr>
+          <p:spPr>
+            <a:xfrm>
+              <a:off x="4801165" y="1218144"/>
+              <a:ext cx="2198393" cy="1717226"/>
+            </a:xfrm>
+            <a:prstGeom prst="rect">
+              <a:avLst/>
+            </a:prstGeom>
+            <a:grpFill/>
+            <a:ln>
+              <a:solidFill>
+                <a:schemeClr val="tx1"/>
+              </a:solidFill>
+            </a:ln>
+          </p:spPr>
+          <p:style>
+            <a:lnRef idx="2">
+              <a:schemeClr val="accent1">
+                <a:shade val="50000"/>
+              </a:schemeClr>
+            </a:lnRef>
+            <a:fillRef idx="1">
+              <a:schemeClr val="accent1"/>
+            </a:fillRef>
+            <a:effectRef idx="0">
+              <a:schemeClr val="accent1"/>
+            </a:effectRef>
+            <a:fontRef idx="minor">
+              <a:schemeClr val="lt1"/>
+            </a:fontRef>
+          </p:style>
+          <p:txBody>
+            <a:bodyPr rtlCol="0" anchor="t"/>
+            <a:lstStyle/>
+            <a:p>
+              <a:pPr algn="ctr"/>
+              <a:r>
+                <a:rPr lang="en-US" sz="1200" dirty="0">
+                  <a:solidFill>
+                    <a:prstClr val="black"/>
+                  </a:solidFill>
+                  <a:latin typeface="Calibri"/>
+                </a:rPr>
+                <a:t>Global Server</a:t>
+              </a:r>
+            </a:p>
+          </p:txBody>
+        </p:sp>
+        <p:sp>
+          <p:nvSpPr>
+            <p:cNvPr id="5" name="Rectangle 4">
+              <a:extLst>
+                <a:ext uri="{FF2B5EF4-FFF2-40B4-BE49-F238E27FC236}">
+                  <a16:creationId xmlns:a16="http://schemas.microsoft.com/office/drawing/2014/main" id="{1981C415-8AE6-3058-2DBD-CA3F9151DB21}"/>
+                </a:ext>
+              </a:extLst>
+            </p:cNvPr>
+            <p:cNvSpPr/>
+            <p:nvPr/>
+          </p:nvSpPr>
+          <p:spPr>
+            <a:xfrm>
+              <a:off x="654884" y="1025973"/>
+              <a:ext cx="2199440" cy="1072052"/>
+            </a:xfrm>
+            <a:prstGeom prst="rect">
+              <a:avLst/>
+            </a:prstGeom>
+            <a:grpFill/>
+            <a:ln>
+              <a:solidFill>
+                <a:schemeClr val="tx1"/>
+              </a:solidFill>
+            </a:ln>
+          </p:spPr>
+          <p:style>
+            <a:lnRef idx="2">
+              <a:schemeClr val="accent1">
+                <a:shade val="50000"/>
+              </a:schemeClr>
+            </a:lnRef>
+            <a:fillRef idx="1">
+              <a:schemeClr val="accent1"/>
+            </a:fillRef>
+            <a:effectRef idx="0">
+              <a:schemeClr val="accent1"/>
+            </a:effectRef>
+            <a:fontRef idx="minor">
+              <a:schemeClr val="lt1"/>
+            </a:fontRef>
+          </p:style>
+          <p:txBody>
+            <a:bodyPr rtlCol="0" anchor="t"/>
+            <a:lstStyle/>
+            <a:p>
+              <a:pPr algn="ctr"/>
+              <a:r>
+                <a:rPr lang="en-US" sz="1200" dirty="0">
+                  <a:solidFill>
+                    <a:prstClr val="black"/>
+                  </a:solidFill>
+                  <a:latin typeface="Calibri"/>
+                </a:rPr>
+                <a:t>Global Client</a:t>
+              </a:r>
+            </a:p>
+          </p:txBody>
+        </p:sp>
+        <p:sp>
+          <p:nvSpPr>
+            <p:cNvPr id="2" name="Rounded Rectangle 1">
+              <a:extLst>
+                <a:ext uri="{FF2B5EF4-FFF2-40B4-BE49-F238E27FC236}">
+                  <a16:creationId xmlns:a16="http://schemas.microsoft.com/office/drawing/2014/main" id="{11F0707A-A2BF-AF55-F60C-0372AFF0E55C}"/>
+                </a:ext>
+              </a:extLst>
+            </p:cNvPr>
+            <p:cNvSpPr/>
+            <p:nvPr/>
+          </p:nvSpPr>
+          <p:spPr>
+            <a:xfrm>
+              <a:off x="4953565" y="1530017"/>
+              <a:ext cx="1774652" cy="611874"/>
+            </a:xfrm>
+            <a:prstGeom prst="roundRect">
+              <a:avLst/>
+            </a:prstGeom>
+            <a:grpFill/>
+            <a:ln>
+              <a:solidFill>
+                <a:schemeClr val="tx1"/>
+              </a:solidFill>
+            </a:ln>
+          </p:spPr>
+          <p:style>
+            <a:lnRef idx="2">
+              <a:schemeClr val="accent1">
+                <a:shade val="50000"/>
+              </a:schemeClr>
+            </a:lnRef>
+            <a:fillRef idx="1">
+              <a:schemeClr val="accent1"/>
+            </a:fillRef>
+            <a:effectRef idx="0">
+              <a:schemeClr val="accent1"/>
+            </a:effectRef>
+            <a:fontRef idx="minor">
+              <a:schemeClr val="lt1"/>
+            </a:fontRef>
+          </p:style>
+          <p:txBody>
+            <a:bodyPr rtlCol="0" anchor="ctr"/>
+            <a:lstStyle/>
+            <a:p>
+              <a:pPr algn="ctr"/>
+              <a:r>
+                <a:rPr lang="en-US" sz="1200" dirty="0">
+                  <a:solidFill>
+                    <a:prstClr val="black"/>
+                  </a:solidFill>
+                  <a:latin typeface="Calibri"/>
+                </a:rPr>
+                <a:t>Directory</a:t>
+              </a:r>
+            </a:p>
+          </p:txBody>
+        </p:sp>
+        <p:sp>
+          <p:nvSpPr>
+            <p:cNvPr id="3" name="Rounded Rectangle 2">
+              <a:extLst>
+                <a:ext uri="{FF2B5EF4-FFF2-40B4-BE49-F238E27FC236}">
+                  <a16:creationId xmlns:a16="http://schemas.microsoft.com/office/drawing/2014/main" id="{79D9A5C3-65FA-DCC7-174B-B9A1975A7F58}"/>
+                </a:ext>
+              </a:extLst>
+            </p:cNvPr>
+            <p:cNvSpPr/>
+            <p:nvPr/>
+          </p:nvSpPr>
+          <p:spPr>
+            <a:xfrm>
+              <a:off x="832281" y="1364680"/>
+              <a:ext cx="1927922" cy="611039"/>
+            </a:xfrm>
+            <a:prstGeom prst="roundRect">
+              <a:avLst/>
+            </a:prstGeom>
+            <a:grpFill/>
+            <a:ln>
+              <a:solidFill>
+                <a:schemeClr val="tx1"/>
+              </a:solidFill>
+            </a:ln>
+          </p:spPr>
+          <p:style>
+            <a:lnRef idx="2">
+              <a:schemeClr val="accent1">
+                <a:shade val="50000"/>
+              </a:schemeClr>
+            </a:lnRef>
+            <a:fillRef idx="1">
+              <a:schemeClr val="accent1"/>
+            </a:fillRef>
+            <a:effectRef idx="0">
+              <a:schemeClr val="accent1"/>
+            </a:effectRef>
+            <a:fontRef idx="minor">
+              <a:schemeClr val="lt1"/>
+            </a:fontRef>
+          </p:style>
+          <p:txBody>
+            <a:bodyPr rtlCol="0" anchor="ctr"/>
+            <a:lstStyle/>
+            <a:p>
+              <a:pPr algn="ctr"/>
+              <a:r>
+                <a:rPr lang="en-US" sz="1200" dirty="0">
+                  <a:solidFill>
+                    <a:prstClr val="black"/>
+                  </a:solidFill>
+                  <a:latin typeface="Calibri"/>
+                </a:rPr>
+                <a:t>Query Client</a:t>
+              </a:r>
+            </a:p>
+          </p:txBody>
+        </p:sp>
+        <p:sp>
+          <p:nvSpPr>
+            <p:cNvPr id="7" name="Rounded Rectangle 6">
+              <a:extLst>
+                <a:ext uri="{FF2B5EF4-FFF2-40B4-BE49-F238E27FC236}">
+                  <a16:creationId xmlns:a16="http://schemas.microsoft.com/office/drawing/2014/main" id="{5691CD69-EE5E-4EB1-09DD-7F5C17C7C015}"/>
+                </a:ext>
+              </a:extLst>
+            </p:cNvPr>
+            <p:cNvSpPr/>
+            <p:nvPr/>
+          </p:nvSpPr>
+          <p:spPr>
+            <a:xfrm>
+              <a:off x="4953565" y="2141894"/>
+              <a:ext cx="1774652" cy="637487"/>
+            </a:xfrm>
+            <a:prstGeom prst="roundRect">
+              <a:avLst/>
+            </a:prstGeom>
+            <a:grpFill/>
+            <a:ln>
+              <a:solidFill>
+                <a:schemeClr val="tx1"/>
+              </a:solidFill>
+            </a:ln>
+          </p:spPr>
+          <p:style>
+            <a:lnRef idx="2">
+              <a:schemeClr val="accent1">
+                <a:shade val="50000"/>
+              </a:schemeClr>
+            </a:lnRef>
+            <a:fillRef idx="1">
+              <a:schemeClr val="accent1"/>
+            </a:fillRef>
+            <a:effectRef idx="0">
+              <a:schemeClr val="accent1"/>
+            </a:effectRef>
+            <a:fontRef idx="minor">
+              <a:schemeClr val="lt1"/>
+            </a:fontRef>
+          </p:style>
+          <p:txBody>
+            <a:bodyPr rtlCol="0" anchor="ctr"/>
+            <a:lstStyle/>
+            <a:p>
+              <a:pPr algn="ctr"/>
+              <a:r>
+                <a:rPr lang="en-US" sz="1200" dirty="0">
+                  <a:solidFill>
+                    <a:prstClr val="black"/>
+                  </a:solidFill>
+                  <a:latin typeface="Calibri"/>
+                </a:rPr>
+                <a:t>Update Client</a:t>
+              </a:r>
+            </a:p>
+          </p:txBody>
+        </p:sp>
+      </p:grpSp>
+      <p:grpSp>
+        <p:nvGrpSpPr>
+          <p:cNvPr id="14" name="Group 13">
+            <a:extLst>
+              <a:ext uri="{FF2B5EF4-FFF2-40B4-BE49-F238E27FC236}">
+                <a16:creationId xmlns:a16="http://schemas.microsoft.com/office/drawing/2014/main" id="{F4DDB245-39C3-B4BA-A16E-88D2AF4A2A1C}"/>
+              </a:ext>
+            </a:extLst>
+          </p:cNvPr>
+          <p:cNvGrpSpPr/>
+          <p:nvPr/>
+        </p:nvGrpSpPr>
+        <p:grpSpPr>
+          <a:xfrm>
+            <a:off x="1700234" y="2600340"/>
+            <a:ext cx="5122126" cy="1133460"/>
+            <a:chOff x="741753" y="4115294"/>
+            <a:chExt cx="7915060" cy="1751501"/>
+          </a:xfrm>
+          <a:solidFill>
+            <a:schemeClr val="bg1"/>
+          </a:solidFill>
+        </p:grpSpPr>
+        <p:sp>
+          <p:nvSpPr>
+            <p:cNvPr id="8" name="Rectangle 7">
+              <a:extLst>
+                <a:ext uri="{FF2B5EF4-FFF2-40B4-BE49-F238E27FC236}">
+                  <a16:creationId xmlns:a16="http://schemas.microsoft.com/office/drawing/2014/main" id="{68FDCF1D-5965-2C7B-0293-4B4D85F5C9B4}"/>
+                </a:ext>
+              </a:extLst>
+            </p:cNvPr>
+            <p:cNvSpPr/>
+            <p:nvPr/>
+          </p:nvSpPr>
+          <p:spPr>
+            <a:xfrm>
+              <a:off x="4721059" y="4139287"/>
+              <a:ext cx="3935754" cy="1727508"/>
+            </a:xfrm>
+            <a:prstGeom prst="rect">
+              <a:avLst/>
+            </a:prstGeom>
+            <a:grpFill/>
+            <a:ln>
+              <a:solidFill>
+                <a:schemeClr val="tx1"/>
+              </a:solidFill>
+            </a:ln>
+          </p:spPr>
+          <p:style>
+            <a:lnRef idx="2">
+              <a:schemeClr val="accent1">
+                <a:shade val="50000"/>
+              </a:schemeClr>
+            </a:lnRef>
+            <a:fillRef idx="1">
+              <a:schemeClr val="accent1"/>
+            </a:fillRef>
+            <a:effectRef idx="0">
+              <a:schemeClr val="accent1"/>
+            </a:effectRef>
+            <a:fontRef idx="minor">
+              <a:schemeClr val="lt1"/>
+            </a:fontRef>
+          </p:style>
+          <p:txBody>
+            <a:bodyPr rtlCol="0" anchor="t"/>
+            <a:lstStyle/>
+            <a:p>
+              <a:pPr algn="ctr"/>
+              <a:r>
+                <a:rPr lang="en-US" sz="1000" dirty="0">
+                  <a:solidFill>
+                    <a:prstClr val="black"/>
+                  </a:solidFill>
+                  <a:latin typeface="Calibri"/>
+                </a:rPr>
+                <a:t>Country Server</a:t>
+              </a:r>
+            </a:p>
+          </p:txBody>
+        </p:sp>
+        <p:sp>
+          <p:nvSpPr>
+            <p:cNvPr id="9" name="Rectangle 8">
+              <a:extLst>
+                <a:ext uri="{FF2B5EF4-FFF2-40B4-BE49-F238E27FC236}">
+                  <a16:creationId xmlns:a16="http://schemas.microsoft.com/office/drawing/2014/main" id="{3F275F8A-A86A-8442-3D87-F9CE65F8F54C}"/>
+                </a:ext>
+              </a:extLst>
+            </p:cNvPr>
+            <p:cNvSpPr/>
+            <p:nvPr/>
+          </p:nvSpPr>
+          <p:spPr>
+            <a:xfrm>
+              <a:off x="741753" y="4115294"/>
+              <a:ext cx="2318159" cy="1151131"/>
+            </a:xfrm>
+            <a:prstGeom prst="rect">
+              <a:avLst/>
+            </a:prstGeom>
+            <a:grpFill/>
+            <a:ln>
+              <a:solidFill>
+                <a:schemeClr val="tx1"/>
+              </a:solidFill>
+            </a:ln>
+          </p:spPr>
+          <p:style>
+            <a:lnRef idx="2">
+              <a:schemeClr val="accent1">
+                <a:shade val="50000"/>
+              </a:schemeClr>
+            </a:lnRef>
+            <a:fillRef idx="1">
+              <a:schemeClr val="accent1"/>
+            </a:fillRef>
+            <a:effectRef idx="0">
+              <a:schemeClr val="accent1"/>
+            </a:effectRef>
+            <a:fontRef idx="minor">
+              <a:schemeClr val="lt1"/>
+            </a:fontRef>
+          </p:style>
+          <p:txBody>
+            <a:bodyPr rtlCol="0" anchor="t"/>
+            <a:lstStyle/>
+            <a:p>
+              <a:pPr algn="ctr"/>
+              <a:r>
+                <a:rPr lang="en-US" sz="1000" dirty="0">
+                  <a:solidFill>
+                    <a:prstClr val="black"/>
+                  </a:solidFill>
+                  <a:latin typeface="Calibri"/>
+                </a:rPr>
+                <a:t>Country Client</a:t>
+              </a:r>
+            </a:p>
+          </p:txBody>
+        </p:sp>
+        <p:sp>
+          <p:nvSpPr>
+            <p:cNvPr id="10" name="Rounded Rectangle 9">
+              <a:extLst>
+                <a:ext uri="{FF2B5EF4-FFF2-40B4-BE49-F238E27FC236}">
+                  <a16:creationId xmlns:a16="http://schemas.microsoft.com/office/drawing/2014/main" id="{60EE3432-75A4-1717-D980-AE90B4B8B9DA}"/>
+                </a:ext>
+              </a:extLst>
+            </p:cNvPr>
+            <p:cNvSpPr/>
+            <p:nvPr/>
+          </p:nvSpPr>
+          <p:spPr>
+            <a:xfrm>
+              <a:off x="5778828" y="4487174"/>
+              <a:ext cx="1909545" cy="622411"/>
+            </a:xfrm>
+            <a:prstGeom prst="roundRect">
+              <a:avLst/>
+            </a:prstGeom>
+            <a:grpFill/>
+            <a:ln>
+              <a:solidFill>
+                <a:schemeClr val="tx1"/>
+              </a:solidFill>
+            </a:ln>
+          </p:spPr>
+          <p:style>
+            <a:lnRef idx="2">
+              <a:schemeClr val="accent1">
+                <a:shade val="50000"/>
+              </a:schemeClr>
+            </a:lnRef>
+            <a:fillRef idx="1">
+              <a:schemeClr val="accent1"/>
+            </a:fillRef>
+            <a:effectRef idx="0">
+              <a:schemeClr val="accent1"/>
+            </a:effectRef>
+            <a:fontRef idx="minor">
+              <a:schemeClr val="lt1"/>
+            </a:fontRef>
+          </p:style>
+          <p:txBody>
+            <a:bodyPr rtlCol="0" anchor="ctr"/>
+            <a:lstStyle/>
+            <a:p>
+              <a:pPr algn="ctr"/>
+              <a:r>
+                <a:rPr lang="en-US" sz="1000" dirty="0">
+                  <a:solidFill>
+                    <a:prstClr val="black"/>
+                  </a:solidFill>
+                  <a:latin typeface="Calibri"/>
+                </a:rPr>
+                <a:t>Directory</a:t>
+              </a:r>
+            </a:p>
+          </p:txBody>
+        </p:sp>
+        <p:sp>
+          <p:nvSpPr>
+            <p:cNvPr id="11" name="Rounded Rectangle 10">
+              <a:extLst>
+                <a:ext uri="{FF2B5EF4-FFF2-40B4-BE49-F238E27FC236}">
+                  <a16:creationId xmlns:a16="http://schemas.microsoft.com/office/drawing/2014/main" id="{C0628277-79D8-0A62-198B-00CA0120D754}"/>
+                </a:ext>
+              </a:extLst>
+            </p:cNvPr>
+            <p:cNvSpPr/>
+            <p:nvPr/>
+          </p:nvSpPr>
+          <p:spPr>
+            <a:xfrm>
+              <a:off x="915080" y="4515508"/>
+              <a:ext cx="2014346" cy="630396"/>
+            </a:xfrm>
+            <a:prstGeom prst="roundRect">
+              <a:avLst/>
+            </a:prstGeom>
+            <a:grpFill/>
+            <a:ln>
+              <a:solidFill>
+                <a:schemeClr val="tx1"/>
+              </a:solidFill>
+            </a:ln>
+          </p:spPr>
+          <p:style>
+            <a:lnRef idx="2">
+              <a:schemeClr val="accent1">
+                <a:shade val="50000"/>
+              </a:schemeClr>
+            </a:lnRef>
+            <a:fillRef idx="1">
+              <a:schemeClr val="accent1"/>
+            </a:fillRef>
+            <a:effectRef idx="0">
+              <a:schemeClr val="accent1"/>
+            </a:effectRef>
+            <a:fontRef idx="minor">
+              <a:schemeClr val="lt1"/>
+            </a:fontRef>
+          </p:style>
+          <p:txBody>
+            <a:bodyPr rtlCol="0" anchor="ctr"/>
+            <a:lstStyle/>
+            <a:p>
+              <a:pPr algn="ctr"/>
+              <a:r>
+                <a:rPr lang="en-US" sz="1000" dirty="0">
+                  <a:solidFill>
+                    <a:prstClr val="black"/>
+                  </a:solidFill>
+                  <a:latin typeface="Calibri"/>
+                </a:rPr>
+                <a:t>Query Client</a:t>
+              </a:r>
+            </a:p>
+          </p:txBody>
+        </p:sp>
+        <p:sp>
+          <p:nvSpPr>
+            <p:cNvPr id="13" name="Rounded Rectangle 12">
+              <a:extLst>
+                <a:ext uri="{FF2B5EF4-FFF2-40B4-BE49-F238E27FC236}">
+                  <a16:creationId xmlns:a16="http://schemas.microsoft.com/office/drawing/2014/main" id="{7834A749-BBF0-62B2-CCB9-96D9B7FE7E2A}"/>
+                </a:ext>
+              </a:extLst>
+            </p:cNvPr>
+            <p:cNvSpPr/>
+            <p:nvPr/>
+          </p:nvSpPr>
+          <p:spPr>
+            <a:xfrm>
+              <a:off x="5778828" y="5109584"/>
+              <a:ext cx="1885104" cy="639459"/>
+            </a:xfrm>
+            <a:prstGeom prst="roundRect">
+              <a:avLst/>
+            </a:prstGeom>
+            <a:grpFill/>
+            <a:ln>
+              <a:solidFill>
+                <a:schemeClr val="tx1"/>
+              </a:solidFill>
+            </a:ln>
+          </p:spPr>
+          <p:style>
+            <a:lnRef idx="2">
+              <a:schemeClr val="accent1">
+                <a:shade val="50000"/>
+              </a:schemeClr>
+            </a:lnRef>
+            <a:fillRef idx="1">
+              <a:schemeClr val="accent1"/>
+            </a:fillRef>
+            <a:effectRef idx="0">
+              <a:schemeClr val="accent1"/>
+            </a:effectRef>
+            <a:fontRef idx="minor">
+              <a:schemeClr val="lt1"/>
+            </a:fontRef>
+          </p:style>
+          <p:txBody>
+            <a:bodyPr rtlCol="0" anchor="ctr"/>
+            <a:lstStyle/>
+            <a:p>
+              <a:pPr algn="ctr"/>
+              <a:r>
+                <a:rPr lang="en-US" sz="1000" dirty="0">
+                  <a:solidFill>
+                    <a:prstClr val="black"/>
+                  </a:solidFill>
+                  <a:latin typeface="Calibri"/>
+                </a:rPr>
+                <a:t>Update Client</a:t>
+              </a:r>
+            </a:p>
+          </p:txBody>
+        </p:sp>
+      </p:grpSp>
+      <p:grpSp>
+        <p:nvGrpSpPr>
+          <p:cNvPr id="27" name="Group 26">
+            <a:extLst>
+              <a:ext uri="{FF2B5EF4-FFF2-40B4-BE49-F238E27FC236}">
+                <a16:creationId xmlns:a16="http://schemas.microsoft.com/office/drawing/2014/main" id="{093C8748-D5FB-1F06-C1F4-ACA28DAD097B}"/>
+              </a:ext>
+            </a:extLst>
+          </p:cNvPr>
+          <p:cNvGrpSpPr/>
+          <p:nvPr/>
+        </p:nvGrpSpPr>
+        <p:grpSpPr>
+          <a:xfrm>
+            <a:off x="2796527" y="4818182"/>
+            <a:ext cx="1530336" cy="773175"/>
+            <a:chOff x="4339000" y="4647807"/>
+            <a:chExt cx="1530336" cy="773175"/>
+          </a:xfrm>
+          <a:solidFill>
+            <a:schemeClr val="bg1"/>
+          </a:solidFill>
+        </p:grpSpPr>
+        <p:sp>
+          <p:nvSpPr>
+            <p:cNvPr id="21" name="Rectangle 20">
+              <a:extLst>
+                <a:ext uri="{FF2B5EF4-FFF2-40B4-BE49-F238E27FC236}">
+                  <a16:creationId xmlns:a16="http://schemas.microsoft.com/office/drawing/2014/main" id="{CB4550D3-A40E-1A99-B225-58BE607118D8}"/>
+                </a:ext>
+              </a:extLst>
+            </p:cNvPr>
+            <p:cNvSpPr/>
+            <p:nvPr/>
+          </p:nvSpPr>
+          <p:spPr>
+            <a:xfrm>
+              <a:off x="4339000" y="4647807"/>
+              <a:ext cx="1530336" cy="773175"/>
+            </a:xfrm>
+            <a:prstGeom prst="rect">
+              <a:avLst/>
+            </a:prstGeom>
+            <a:grpFill/>
+            <a:ln>
+              <a:solidFill>
+                <a:schemeClr val="tx1"/>
+              </a:solidFill>
+            </a:ln>
+          </p:spPr>
+          <p:style>
+            <a:lnRef idx="2">
+              <a:schemeClr val="accent1">
+                <a:shade val="50000"/>
+              </a:schemeClr>
+            </a:lnRef>
+            <a:fillRef idx="1">
+              <a:schemeClr val="accent1"/>
+            </a:fillRef>
+            <a:effectRef idx="0">
+              <a:schemeClr val="accent1"/>
+            </a:effectRef>
+            <a:fontRef idx="minor">
+              <a:schemeClr val="lt1"/>
+            </a:fontRef>
+          </p:style>
+          <p:txBody>
+            <a:bodyPr rtlCol="0" anchor="t"/>
+            <a:lstStyle/>
+            <a:p>
+              <a:pPr algn="ctr"/>
+              <a:r>
+                <a:rPr lang="en-US" sz="1000" dirty="0">
+                  <a:solidFill>
+                    <a:prstClr val="black"/>
+                  </a:solidFill>
+                  <a:latin typeface="Calibri"/>
+                </a:rPr>
+                <a:t>Local Server</a:t>
+              </a:r>
+            </a:p>
+          </p:txBody>
+        </p:sp>
+        <p:sp>
+          <p:nvSpPr>
+            <p:cNvPr id="20" name="Rounded Rectangle 19">
+              <a:extLst>
+                <a:ext uri="{FF2B5EF4-FFF2-40B4-BE49-F238E27FC236}">
+                  <a16:creationId xmlns:a16="http://schemas.microsoft.com/office/drawing/2014/main" id="{86BECB67-C549-33AF-23A9-EF0DDCDA50F9}"/>
+                </a:ext>
+              </a:extLst>
+            </p:cNvPr>
+            <p:cNvSpPr/>
+            <p:nvPr/>
+          </p:nvSpPr>
+          <p:spPr>
+            <a:xfrm>
+              <a:off x="4453547" y="4901544"/>
+              <a:ext cx="1320745" cy="392760"/>
+            </a:xfrm>
+            <a:prstGeom prst="roundRect">
+              <a:avLst/>
+            </a:prstGeom>
+            <a:grpFill/>
+            <a:ln>
+              <a:solidFill>
+                <a:schemeClr val="tx1"/>
+              </a:solidFill>
+            </a:ln>
+          </p:spPr>
+          <p:style>
+            <a:lnRef idx="2">
+              <a:schemeClr val="accent1">
+                <a:shade val="50000"/>
+              </a:schemeClr>
+            </a:lnRef>
+            <a:fillRef idx="1">
+              <a:schemeClr val="accent1"/>
+            </a:fillRef>
+            <a:effectRef idx="0">
+              <a:schemeClr val="accent1"/>
+            </a:effectRef>
+            <a:fontRef idx="minor">
+              <a:schemeClr val="lt1"/>
+            </a:fontRef>
+          </p:style>
+          <p:txBody>
+            <a:bodyPr rtlCol="0" anchor="ctr"/>
+            <a:lstStyle/>
+            <a:p>
+              <a:pPr algn="ctr"/>
+              <a:r>
+                <a:rPr lang="en-US" sz="1000" dirty="0">
+                  <a:solidFill>
+                    <a:prstClr val="black"/>
+                  </a:solidFill>
+                  <a:latin typeface="Calibri"/>
+                </a:rPr>
+                <a:t>Directory</a:t>
+              </a:r>
+            </a:p>
+          </p:txBody>
+        </p:sp>
+      </p:grpSp>
+      <p:grpSp>
+        <p:nvGrpSpPr>
+          <p:cNvPr id="28" name="Group 27">
+            <a:extLst>
+              <a:ext uri="{FF2B5EF4-FFF2-40B4-BE49-F238E27FC236}">
+                <a16:creationId xmlns:a16="http://schemas.microsoft.com/office/drawing/2014/main" id="{AB1B5206-1C84-E207-7986-F5B8194AEB02}"/>
+              </a:ext>
+            </a:extLst>
+          </p:cNvPr>
+          <p:cNvGrpSpPr/>
+          <p:nvPr/>
+        </p:nvGrpSpPr>
+        <p:grpSpPr>
+          <a:xfrm>
+            <a:off x="4790476" y="4837724"/>
+            <a:ext cx="1607089" cy="773760"/>
+            <a:chOff x="3992483" y="4392283"/>
+            <a:chExt cx="1607089" cy="773760"/>
+          </a:xfrm>
+          <a:solidFill>
+            <a:schemeClr val="bg1"/>
+          </a:solidFill>
+        </p:grpSpPr>
+        <p:sp>
+          <p:nvSpPr>
+            <p:cNvPr id="29" name="Rectangle 28">
+              <a:extLst>
+                <a:ext uri="{FF2B5EF4-FFF2-40B4-BE49-F238E27FC236}">
+                  <a16:creationId xmlns:a16="http://schemas.microsoft.com/office/drawing/2014/main" id="{BCB22804-0C31-11C1-98AF-64B55857C06A}"/>
+                </a:ext>
+              </a:extLst>
+            </p:cNvPr>
+            <p:cNvSpPr/>
+            <p:nvPr/>
+          </p:nvSpPr>
+          <p:spPr>
+            <a:xfrm>
+              <a:off x="3992483" y="4392283"/>
+              <a:ext cx="1607089" cy="773760"/>
+            </a:xfrm>
+            <a:prstGeom prst="rect">
+              <a:avLst/>
+            </a:prstGeom>
+            <a:grpFill/>
+            <a:ln>
+              <a:solidFill>
+                <a:schemeClr val="tx1"/>
+              </a:solidFill>
+            </a:ln>
+          </p:spPr>
+          <p:style>
+            <a:lnRef idx="2">
+              <a:schemeClr val="accent1">
+                <a:shade val="50000"/>
+              </a:schemeClr>
+            </a:lnRef>
+            <a:fillRef idx="1">
+              <a:schemeClr val="accent1"/>
+            </a:fillRef>
+            <a:effectRef idx="0">
+              <a:schemeClr val="accent1"/>
+            </a:effectRef>
+            <a:fontRef idx="minor">
+              <a:schemeClr val="lt1"/>
+            </a:fontRef>
+          </p:style>
+          <p:txBody>
+            <a:bodyPr rtlCol="0" anchor="t"/>
+            <a:lstStyle/>
+            <a:p>
+              <a:pPr algn="ctr"/>
+              <a:r>
+                <a:rPr lang="en-US" sz="1000" dirty="0">
+                  <a:solidFill>
+                    <a:prstClr val="black"/>
+                  </a:solidFill>
+                  <a:latin typeface="Calibri"/>
+                </a:rPr>
+                <a:t>Local Server</a:t>
+              </a:r>
+            </a:p>
+          </p:txBody>
+        </p:sp>
+        <p:sp>
+          <p:nvSpPr>
+            <p:cNvPr id="30" name="Rounded Rectangle 29">
+              <a:extLst>
+                <a:ext uri="{FF2B5EF4-FFF2-40B4-BE49-F238E27FC236}">
+                  <a16:creationId xmlns:a16="http://schemas.microsoft.com/office/drawing/2014/main" id="{52D96583-2D3A-EE48-1A83-7546606BC47D}"/>
+                </a:ext>
+              </a:extLst>
+            </p:cNvPr>
+            <p:cNvSpPr/>
+            <p:nvPr/>
+          </p:nvSpPr>
+          <p:spPr>
+            <a:xfrm>
+              <a:off x="4111715" y="4626477"/>
+              <a:ext cx="1335457" cy="392760"/>
+            </a:xfrm>
+            <a:prstGeom prst="roundRect">
+              <a:avLst/>
+            </a:prstGeom>
+            <a:grpFill/>
+            <a:ln>
+              <a:solidFill>
+                <a:schemeClr val="tx1"/>
+              </a:solidFill>
+            </a:ln>
+          </p:spPr>
+          <p:style>
+            <a:lnRef idx="2">
+              <a:schemeClr val="accent1">
+                <a:shade val="50000"/>
+              </a:schemeClr>
+            </a:lnRef>
+            <a:fillRef idx="1">
+              <a:schemeClr val="accent1"/>
+            </a:fillRef>
+            <a:effectRef idx="0">
+              <a:schemeClr val="accent1"/>
+            </a:effectRef>
+            <a:fontRef idx="minor">
+              <a:schemeClr val="lt1"/>
+            </a:fontRef>
+          </p:style>
+          <p:txBody>
+            <a:bodyPr rtlCol="0" anchor="ctr"/>
+            <a:lstStyle/>
+            <a:p>
+              <a:pPr algn="ctr"/>
+              <a:r>
+                <a:rPr lang="en-US" sz="1000" dirty="0">
+                  <a:solidFill>
+                    <a:prstClr val="black"/>
+                  </a:solidFill>
+                  <a:latin typeface="Calibri"/>
+                </a:rPr>
+                <a:t>Directory</a:t>
+              </a:r>
+            </a:p>
+          </p:txBody>
+        </p:sp>
+      </p:grpSp>
+      <p:grpSp>
+        <p:nvGrpSpPr>
+          <p:cNvPr id="41" name="Group 40">
+            <a:extLst>
+              <a:ext uri="{FF2B5EF4-FFF2-40B4-BE49-F238E27FC236}">
+                <a16:creationId xmlns:a16="http://schemas.microsoft.com/office/drawing/2014/main" id="{549C314A-9748-6B27-3865-CE914922E337}"/>
+              </a:ext>
+            </a:extLst>
+          </p:cNvPr>
+          <p:cNvGrpSpPr/>
+          <p:nvPr/>
+        </p:nvGrpSpPr>
+        <p:grpSpPr>
+          <a:xfrm>
+            <a:off x="2481446" y="1173058"/>
+            <a:ext cx="1708609" cy="887151"/>
+            <a:chOff x="-3185500" y="2869816"/>
+            <a:chExt cx="1708609" cy="887151"/>
+          </a:xfrm>
+          <a:solidFill>
+            <a:schemeClr val="bg1"/>
+          </a:solidFill>
+        </p:grpSpPr>
+        <p:sp>
+          <p:nvSpPr>
+            <p:cNvPr id="42" name="Rectangle 41">
+              <a:extLst>
+                <a:ext uri="{FF2B5EF4-FFF2-40B4-BE49-F238E27FC236}">
+                  <a16:creationId xmlns:a16="http://schemas.microsoft.com/office/drawing/2014/main" id="{E8F21B43-6C31-2B24-878B-1A9793B7E61B}"/>
+                </a:ext>
+              </a:extLst>
+            </p:cNvPr>
+            <p:cNvSpPr/>
+            <p:nvPr/>
+          </p:nvSpPr>
+          <p:spPr>
+            <a:xfrm>
+              <a:off x="-3185500" y="2869816"/>
+              <a:ext cx="1708609" cy="887151"/>
+            </a:xfrm>
+            <a:prstGeom prst="rect">
+              <a:avLst/>
+            </a:prstGeom>
+            <a:grpFill/>
+            <a:ln>
+              <a:solidFill>
+                <a:schemeClr val="tx1"/>
+              </a:solidFill>
+            </a:ln>
+          </p:spPr>
+          <p:style>
+            <a:lnRef idx="2">
+              <a:schemeClr val="accent1">
+                <a:shade val="50000"/>
+              </a:schemeClr>
+            </a:lnRef>
+            <a:fillRef idx="1">
+              <a:schemeClr val="accent1"/>
+            </a:fillRef>
+            <a:effectRef idx="0">
+              <a:schemeClr val="accent1"/>
+            </a:effectRef>
+            <a:fontRef idx="minor">
+              <a:schemeClr val="lt1"/>
+            </a:fontRef>
+          </p:style>
+          <p:txBody>
+            <a:bodyPr rtlCol="0" anchor="t"/>
+            <a:lstStyle/>
+            <a:p>
+              <a:pPr algn="ctr"/>
+              <a:r>
+                <a:rPr lang="en-US" sz="1000" dirty="0">
+                  <a:solidFill>
+                    <a:prstClr val="black"/>
+                  </a:solidFill>
+                  <a:latin typeface="Calibri"/>
+                </a:rPr>
+                <a:t>Implementing Partner</a:t>
+              </a:r>
+            </a:p>
+            <a:p>
+              <a:pPr algn="ctr"/>
+              <a:r>
+                <a:rPr lang="en-US" sz="1000" dirty="0">
+                  <a:solidFill>
+                    <a:prstClr val="black"/>
+                  </a:solidFill>
+                  <a:latin typeface="Calibri"/>
+                </a:rPr>
+                <a:t>Server</a:t>
+              </a:r>
+            </a:p>
+          </p:txBody>
+        </p:sp>
+        <p:sp>
+          <p:nvSpPr>
+            <p:cNvPr id="43" name="Rounded Rectangle 42">
+              <a:extLst>
+                <a:ext uri="{FF2B5EF4-FFF2-40B4-BE49-F238E27FC236}">
+                  <a16:creationId xmlns:a16="http://schemas.microsoft.com/office/drawing/2014/main" id="{81849927-A8B6-71F3-91D4-D590FC4A62F2}"/>
+                </a:ext>
+              </a:extLst>
+            </p:cNvPr>
+            <p:cNvSpPr/>
+            <p:nvPr/>
+          </p:nvSpPr>
+          <p:spPr>
+            <a:xfrm>
+              <a:off x="-2956371" y="3208061"/>
+              <a:ext cx="1343664" cy="479133"/>
+            </a:xfrm>
+            <a:prstGeom prst="roundRect">
+              <a:avLst/>
+            </a:prstGeom>
+            <a:grpFill/>
+            <a:ln>
+              <a:solidFill>
+                <a:schemeClr val="tx1"/>
+              </a:solidFill>
+            </a:ln>
+          </p:spPr>
+          <p:style>
+            <a:lnRef idx="2">
+              <a:schemeClr val="accent1">
+                <a:shade val="50000"/>
+              </a:schemeClr>
+            </a:lnRef>
+            <a:fillRef idx="1">
+              <a:schemeClr val="accent1"/>
+            </a:fillRef>
+            <a:effectRef idx="0">
+              <a:schemeClr val="accent1"/>
+            </a:effectRef>
+            <a:fontRef idx="minor">
+              <a:schemeClr val="lt1"/>
+            </a:fontRef>
+          </p:style>
+          <p:txBody>
+            <a:bodyPr rtlCol="0" anchor="ctr"/>
+            <a:lstStyle/>
+            <a:p>
+              <a:pPr algn="ctr"/>
+              <a:r>
+                <a:rPr lang="en-US" sz="1000" dirty="0">
+                  <a:solidFill>
+                    <a:prstClr val="black"/>
+                  </a:solidFill>
+                  <a:latin typeface="Calibri"/>
+                </a:rPr>
+                <a:t>Directory</a:t>
+              </a:r>
+            </a:p>
+          </p:txBody>
+        </p:sp>
+      </p:grpSp>
+      <p:cxnSp>
+        <p:nvCxnSpPr>
+          <p:cNvPr id="22" name="Straight Arrow Connector 21">
+            <a:extLst>
+              <a:ext uri="{FF2B5EF4-FFF2-40B4-BE49-F238E27FC236}">
+                <a16:creationId xmlns:a16="http://schemas.microsoft.com/office/drawing/2014/main" id="{B37E6AE8-EC9F-3E32-7ED1-BCB2C3F46CED}"/>
+              </a:ext>
+            </a:extLst>
+          </p:cNvPr>
+          <p:cNvCxnSpPr>
+            <a:stCxn id="3" idx="3"/>
+            <a:endCxn id="2" idx="1"/>
+          </p:cNvCxnSpPr>
+          <p:nvPr/>
+        </p:nvCxnSpPr>
+        <p:spPr>
+          <a:xfrm>
+            <a:off x="4115159" y="745255"/>
+            <a:ext cx="1702033" cy="128625"/>
+          </a:xfrm>
+          <a:prstGeom prst="straightConnector1">
+            <a:avLst/>
+          </a:prstGeom>
+          <a:ln>
+            <a:solidFill>
+              <a:schemeClr val="tx1"/>
+            </a:solidFill>
+            <a:tailEnd type="arrow"/>
+          </a:ln>
+        </p:spPr>
+        <p:style>
+          <a:lnRef idx="1">
+            <a:schemeClr val="accent1"/>
+          </a:lnRef>
+          <a:fillRef idx="0">
+            <a:schemeClr val="accent1"/>
+          </a:fillRef>
+          <a:effectRef idx="0">
+            <a:schemeClr val="accent1"/>
+          </a:effectRef>
+          <a:fontRef idx="minor">
+            <a:schemeClr val="tx1"/>
+          </a:fontRef>
+        </p:style>
+      </p:cxnSp>
+      <p:sp>
+        <p:nvSpPr>
+          <p:cNvPr id="26" name="TextBox 25">
+            <a:extLst>
+              <a:ext uri="{FF2B5EF4-FFF2-40B4-BE49-F238E27FC236}">
+                <a16:creationId xmlns:a16="http://schemas.microsoft.com/office/drawing/2014/main" id="{45301995-DE91-09F7-338C-4F0642A32924}"/>
+              </a:ext>
+            </a:extLst>
+          </p:cNvPr>
+          <p:cNvSpPr txBox="1"/>
+          <p:nvPr/>
+        </p:nvSpPr>
+        <p:spPr>
+          <a:xfrm>
+            <a:off x="4485136" y="528855"/>
+            <a:ext cx="1213794" cy="307777"/>
+          </a:xfrm>
+          <a:prstGeom prst="rect">
+            <a:avLst/>
+          </a:prstGeom>
+          <a:noFill/>
+        </p:spPr>
+        <p:txBody>
+          <a:bodyPr wrap="none" rtlCol="0">
+            <a:spAutoFit/>
+          </a:bodyPr>
+          <a:lstStyle/>
+          <a:p>
+            <a:pPr algn="ctr"/>
+            <a:r>
+              <a:rPr lang="en-US" sz="700" dirty="0">
+                <a:solidFill>
+                  <a:prstClr val="black"/>
+                </a:solidFill>
+                <a:latin typeface="Calibri"/>
+              </a:rPr>
+              <a:t>Find Matching Care Services</a:t>
+            </a:r>
+          </a:p>
+          <a:p>
+            <a:pPr algn="ctr"/>
+            <a:r>
+              <a:rPr lang="en-US" sz="700" dirty="0">
+                <a:solidFill>
+                  <a:prstClr val="black"/>
+                </a:solidFill>
+                <a:latin typeface="Calibri"/>
+              </a:rPr>
+              <a:t>[ITI-90]</a:t>
+            </a:r>
+          </a:p>
+        </p:txBody>
+      </p:sp>
+      <p:cxnSp>
+        <p:nvCxnSpPr>
+          <p:cNvPr id="45" name="Straight Arrow Connector 44">
+            <a:extLst>
+              <a:ext uri="{FF2B5EF4-FFF2-40B4-BE49-F238E27FC236}">
+                <a16:creationId xmlns:a16="http://schemas.microsoft.com/office/drawing/2014/main" id="{9585A95B-E394-2524-A3B3-3C050048510F}"/>
+              </a:ext>
+            </a:extLst>
+          </p:cNvPr>
+          <p:cNvCxnSpPr>
+            <a:stCxn id="11" idx="3"/>
+            <a:endCxn id="10" idx="1"/>
+          </p:cNvCxnSpPr>
+          <p:nvPr/>
+        </p:nvCxnSpPr>
+        <p:spPr>
+          <a:xfrm flipV="1">
+            <a:off x="3115957" y="3042390"/>
+            <a:ext cx="1843953" cy="20919"/>
+          </a:xfrm>
+          <a:prstGeom prst="straightConnector1">
+            <a:avLst/>
+          </a:prstGeom>
+          <a:ln>
+            <a:solidFill>
+              <a:schemeClr val="tx1"/>
+            </a:solidFill>
+            <a:tailEnd type="arrow"/>
+          </a:ln>
+        </p:spPr>
+        <p:style>
+          <a:lnRef idx="1">
+            <a:schemeClr val="accent1"/>
+          </a:lnRef>
+          <a:fillRef idx="0">
+            <a:schemeClr val="accent1"/>
+          </a:fillRef>
+          <a:effectRef idx="0">
+            <a:schemeClr val="accent1"/>
+          </a:effectRef>
+          <a:fontRef idx="minor">
+            <a:schemeClr val="tx1"/>
+          </a:fontRef>
+        </p:style>
+      </p:cxnSp>
+      <p:sp>
+        <p:nvSpPr>
+          <p:cNvPr id="46" name="TextBox 45">
+            <a:extLst>
+              <a:ext uri="{FF2B5EF4-FFF2-40B4-BE49-F238E27FC236}">
+                <a16:creationId xmlns:a16="http://schemas.microsoft.com/office/drawing/2014/main" id="{99845839-81FE-740D-FA86-2D34EFA8B6FE}"/>
+              </a:ext>
+            </a:extLst>
+          </p:cNvPr>
+          <p:cNvSpPr txBox="1"/>
+          <p:nvPr/>
+        </p:nvSpPr>
+        <p:spPr>
+          <a:xfrm>
+            <a:off x="3114513" y="2771314"/>
+            <a:ext cx="1213794" cy="307777"/>
+          </a:xfrm>
+          <a:prstGeom prst="rect">
+            <a:avLst/>
+          </a:prstGeom>
+          <a:noFill/>
+        </p:spPr>
+        <p:txBody>
+          <a:bodyPr wrap="none" rtlCol="0">
+            <a:spAutoFit/>
+          </a:bodyPr>
+          <a:lstStyle/>
+          <a:p>
+            <a:pPr algn="ctr"/>
+            <a:r>
+              <a:rPr lang="en-US" sz="700" dirty="0">
+                <a:solidFill>
+                  <a:prstClr val="black"/>
+                </a:solidFill>
+                <a:latin typeface="Calibri"/>
+              </a:rPr>
+              <a:t>Find Matching Care Services</a:t>
+            </a:r>
+          </a:p>
+          <a:p>
+            <a:pPr algn="ctr"/>
+            <a:r>
+              <a:rPr lang="en-US" sz="700" dirty="0">
+                <a:solidFill>
+                  <a:prstClr val="black"/>
+                </a:solidFill>
+                <a:latin typeface="Calibri"/>
+              </a:rPr>
+              <a:t>[ITI-90]</a:t>
+            </a:r>
+          </a:p>
+        </p:txBody>
+      </p:sp>
+      <p:cxnSp>
+        <p:nvCxnSpPr>
+          <p:cNvPr id="34" name="Straight Arrow Connector 33">
+            <a:extLst>
+              <a:ext uri="{FF2B5EF4-FFF2-40B4-BE49-F238E27FC236}">
+                <a16:creationId xmlns:a16="http://schemas.microsoft.com/office/drawing/2014/main" id="{50A54E78-DDEC-4956-CF8E-3B4204064D02}"/>
+              </a:ext>
+            </a:extLst>
+          </p:cNvPr>
+          <p:cNvCxnSpPr>
+            <a:stCxn id="13" idx="2"/>
+            <a:endCxn id="20" idx="0"/>
+          </p:cNvCxnSpPr>
+          <p:nvPr/>
+        </p:nvCxnSpPr>
+        <p:spPr>
+          <a:xfrm flipH="1">
+            <a:off x="3571447" y="3657598"/>
+            <a:ext cx="1998423" cy="1414321"/>
+          </a:xfrm>
+          <a:prstGeom prst="straightConnector1">
+            <a:avLst/>
+          </a:prstGeom>
+          <a:ln>
+            <a:solidFill>
+              <a:schemeClr val="tx1"/>
+            </a:solidFill>
+            <a:tailEnd type="arrow"/>
+          </a:ln>
+        </p:spPr>
+        <p:style>
+          <a:lnRef idx="1">
+            <a:schemeClr val="accent1"/>
+          </a:lnRef>
+          <a:fillRef idx="0">
+            <a:schemeClr val="accent1"/>
+          </a:fillRef>
+          <a:effectRef idx="0">
+            <a:schemeClr val="accent1"/>
+          </a:effectRef>
+          <a:fontRef idx="minor">
+            <a:schemeClr val="tx1"/>
+          </a:fontRef>
+        </p:style>
+      </p:cxnSp>
+      <p:sp>
+        <p:nvSpPr>
+          <p:cNvPr id="37" name="TextBox 36">
+            <a:extLst>
+              <a:ext uri="{FF2B5EF4-FFF2-40B4-BE49-F238E27FC236}">
+                <a16:creationId xmlns:a16="http://schemas.microsoft.com/office/drawing/2014/main" id="{0B507312-E82E-420A-2A8D-860FEEC61AC2}"/>
+              </a:ext>
+            </a:extLst>
+          </p:cNvPr>
+          <p:cNvSpPr txBox="1"/>
+          <p:nvPr/>
+        </p:nvSpPr>
+        <p:spPr>
+          <a:xfrm>
+            <a:off x="2781708" y="4232783"/>
+            <a:ext cx="1616147" cy="338554"/>
+          </a:xfrm>
+          <a:prstGeom prst="rect">
+            <a:avLst/>
+          </a:prstGeom>
+          <a:noFill/>
+        </p:spPr>
+        <p:txBody>
+          <a:bodyPr wrap="none" rtlCol="0">
+            <a:spAutoFit/>
+          </a:bodyPr>
+          <a:lstStyle/>
+          <a:p>
+            <a:pPr algn="r"/>
+            <a:r>
+              <a:rPr lang="en-US" sz="800" dirty="0">
+                <a:solidFill>
+                  <a:prstClr val="black"/>
+                </a:solidFill>
+                <a:latin typeface="Calibri"/>
+              </a:rPr>
+              <a:t>Request for Care Services Updates</a:t>
+            </a:r>
+          </a:p>
+          <a:p>
+            <a:pPr algn="r"/>
+            <a:r>
+              <a:rPr lang="en-US" sz="800" dirty="0">
+                <a:solidFill>
+                  <a:prstClr val="black"/>
+                </a:solidFill>
+                <a:latin typeface="Calibri"/>
+              </a:rPr>
+              <a:t>[ITI-91]</a:t>
+            </a:r>
+          </a:p>
+        </p:txBody>
+      </p:sp>
+      <p:cxnSp>
+        <p:nvCxnSpPr>
+          <p:cNvPr id="47" name="Straight Arrow Connector 46">
+            <a:extLst>
+              <a:ext uri="{FF2B5EF4-FFF2-40B4-BE49-F238E27FC236}">
+                <a16:creationId xmlns:a16="http://schemas.microsoft.com/office/drawing/2014/main" id="{736C31FD-AC14-DE0D-906C-64D64A513BEC}"/>
+              </a:ext>
+            </a:extLst>
+          </p:cNvPr>
+          <p:cNvCxnSpPr>
+            <a:cxnSpLocks/>
+            <a:stCxn id="7" idx="2"/>
+            <a:endCxn id="10" idx="3"/>
+          </p:cNvCxnSpPr>
+          <p:nvPr/>
+        </p:nvCxnSpPr>
+        <p:spPr>
+          <a:xfrm flipH="1">
+            <a:off x="6195647" y="1605973"/>
+            <a:ext cx="310103" cy="1436417"/>
+          </a:xfrm>
+          <a:prstGeom prst="straightConnector1">
+            <a:avLst/>
+          </a:prstGeom>
+          <a:ln>
+            <a:solidFill>
+              <a:schemeClr val="tx1"/>
+            </a:solidFill>
+            <a:tailEnd type="arrow"/>
+          </a:ln>
+        </p:spPr>
+        <p:style>
+          <a:lnRef idx="1">
+            <a:schemeClr val="accent1"/>
+          </a:lnRef>
+          <a:fillRef idx="0">
+            <a:schemeClr val="accent1"/>
+          </a:fillRef>
+          <a:effectRef idx="0">
+            <a:schemeClr val="accent1"/>
+          </a:effectRef>
+          <a:fontRef idx="minor">
+            <a:schemeClr val="tx1"/>
+          </a:fontRef>
+        </p:style>
+      </p:cxnSp>
+      <p:sp>
+        <p:nvSpPr>
+          <p:cNvPr id="48" name="TextBox 47">
+            <a:extLst>
+              <a:ext uri="{FF2B5EF4-FFF2-40B4-BE49-F238E27FC236}">
+                <a16:creationId xmlns:a16="http://schemas.microsoft.com/office/drawing/2014/main" id="{39357DBB-0602-B185-4106-6FC8AE88F073}"/>
+              </a:ext>
+            </a:extLst>
+          </p:cNvPr>
+          <p:cNvSpPr txBox="1"/>
+          <p:nvPr/>
+        </p:nvSpPr>
+        <p:spPr>
+          <a:xfrm>
+            <a:off x="5400436" y="1752600"/>
+            <a:ext cx="1616147" cy="338554"/>
+          </a:xfrm>
+          <a:prstGeom prst="rect">
+            <a:avLst/>
+          </a:prstGeom>
+          <a:noFill/>
+        </p:spPr>
+        <p:txBody>
+          <a:bodyPr wrap="none" rtlCol="0">
+            <a:spAutoFit/>
+          </a:bodyPr>
+          <a:lstStyle/>
+          <a:p>
+            <a:pPr algn="r"/>
+            <a:r>
+              <a:rPr lang="en-US" sz="800" dirty="0">
+                <a:solidFill>
+                  <a:prstClr val="black"/>
+                </a:solidFill>
+                <a:latin typeface="Calibri"/>
+              </a:rPr>
+              <a:t>Request for Care Services Updates</a:t>
+            </a:r>
+          </a:p>
+          <a:p>
+            <a:pPr algn="r"/>
+            <a:r>
+              <a:rPr lang="en-US" sz="800" dirty="0">
+                <a:solidFill>
+                  <a:prstClr val="black"/>
+                </a:solidFill>
+                <a:latin typeface="Calibri"/>
+              </a:rPr>
+              <a:t>[ITI-91]</a:t>
+            </a:r>
+          </a:p>
+        </p:txBody>
+      </p:sp>
+      <p:cxnSp>
+        <p:nvCxnSpPr>
+          <p:cNvPr id="51" name="Straight Arrow Connector 50">
+            <a:extLst>
+              <a:ext uri="{FF2B5EF4-FFF2-40B4-BE49-F238E27FC236}">
+                <a16:creationId xmlns:a16="http://schemas.microsoft.com/office/drawing/2014/main" id="{049568F4-83F4-13F0-5E30-8D56EC2E33B0}"/>
+              </a:ext>
+            </a:extLst>
+          </p:cNvPr>
+          <p:cNvCxnSpPr>
+            <a:stCxn id="13" idx="2"/>
+            <a:endCxn id="30" idx="0"/>
+          </p:cNvCxnSpPr>
+          <p:nvPr/>
+        </p:nvCxnSpPr>
+        <p:spPr>
+          <a:xfrm>
+            <a:off x="5569870" y="3657598"/>
+            <a:ext cx="7567" cy="1414320"/>
+          </a:xfrm>
+          <a:prstGeom prst="straightConnector1">
+            <a:avLst/>
+          </a:prstGeom>
+          <a:ln>
+            <a:solidFill>
+              <a:schemeClr val="tx1"/>
+            </a:solidFill>
+            <a:tailEnd type="arrow"/>
+          </a:ln>
+        </p:spPr>
+        <p:style>
+          <a:lnRef idx="1">
+            <a:schemeClr val="accent1"/>
+          </a:lnRef>
+          <a:fillRef idx="0">
+            <a:schemeClr val="accent1"/>
+          </a:fillRef>
+          <a:effectRef idx="0">
+            <a:schemeClr val="accent1"/>
+          </a:effectRef>
+          <a:fontRef idx="minor">
+            <a:schemeClr val="tx1"/>
+          </a:fontRef>
+        </p:style>
+      </p:cxnSp>
+      <p:sp>
+        <p:nvSpPr>
+          <p:cNvPr id="52" name="TextBox 51">
+            <a:extLst>
+              <a:ext uri="{FF2B5EF4-FFF2-40B4-BE49-F238E27FC236}">
+                <a16:creationId xmlns:a16="http://schemas.microsoft.com/office/drawing/2014/main" id="{841DD579-F264-8C3B-4948-1ABBECFBF858}"/>
+              </a:ext>
+            </a:extLst>
+          </p:cNvPr>
+          <p:cNvSpPr txBox="1"/>
+          <p:nvPr/>
+        </p:nvSpPr>
+        <p:spPr>
+          <a:xfrm>
+            <a:off x="5206214" y="4103869"/>
+            <a:ext cx="1616147" cy="338554"/>
+          </a:xfrm>
+          <a:prstGeom prst="rect">
+            <a:avLst/>
+          </a:prstGeom>
+          <a:noFill/>
+        </p:spPr>
+        <p:txBody>
+          <a:bodyPr wrap="none" rtlCol="0">
+            <a:spAutoFit/>
+          </a:bodyPr>
+          <a:lstStyle/>
+          <a:p>
+            <a:r>
+              <a:rPr lang="en-US" sz="800" dirty="0">
+                <a:solidFill>
+                  <a:prstClr val="black"/>
+                </a:solidFill>
+                <a:latin typeface="Calibri"/>
+              </a:rPr>
+              <a:t>Request for Care Services Updates</a:t>
+            </a:r>
+          </a:p>
+          <a:p>
+            <a:r>
+              <a:rPr lang="en-US" sz="800" dirty="0">
+                <a:solidFill>
+                  <a:prstClr val="black"/>
+                </a:solidFill>
+                <a:latin typeface="Calibri"/>
+              </a:rPr>
+              <a:t>[ITI-91]</a:t>
+            </a:r>
+          </a:p>
+        </p:txBody>
+      </p:sp>
+      <p:cxnSp>
+        <p:nvCxnSpPr>
+          <p:cNvPr id="55" name="Straight Arrow Connector 54">
+            <a:extLst>
+              <a:ext uri="{FF2B5EF4-FFF2-40B4-BE49-F238E27FC236}">
+                <a16:creationId xmlns:a16="http://schemas.microsoft.com/office/drawing/2014/main" id="{263281AC-1F20-D213-204C-BAB53E376E2A}"/>
+              </a:ext>
+            </a:extLst>
+          </p:cNvPr>
+          <p:cNvCxnSpPr>
+            <a:cxnSpLocks/>
+            <a:stCxn id="7" idx="1"/>
+            <a:endCxn id="43" idx="3"/>
+          </p:cNvCxnSpPr>
+          <p:nvPr/>
+        </p:nvCxnSpPr>
+        <p:spPr>
+          <a:xfrm flipH="1">
+            <a:off x="4054239" y="1358630"/>
+            <a:ext cx="1762952" cy="392240"/>
+          </a:xfrm>
+          <a:prstGeom prst="straightConnector1">
+            <a:avLst/>
+          </a:prstGeom>
+          <a:ln>
+            <a:solidFill>
+              <a:schemeClr val="tx1"/>
+            </a:solidFill>
+            <a:tailEnd type="arrow"/>
+          </a:ln>
+        </p:spPr>
+        <p:style>
+          <a:lnRef idx="1">
+            <a:schemeClr val="accent1"/>
+          </a:lnRef>
+          <a:fillRef idx="0">
+            <a:schemeClr val="accent1"/>
+          </a:fillRef>
+          <a:effectRef idx="0">
+            <a:schemeClr val="accent1"/>
+          </a:effectRef>
+          <a:fontRef idx="minor">
+            <a:schemeClr val="tx1"/>
+          </a:fontRef>
+        </p:style>
+      </p:cxnSp>
+      <p:sp>
+        <p:nvSpPr>
+          <p:cNvPr id="56" name="TextBox 55">
+            <a:extLst>
+              <a:ext uri="{FF2B5EF4-FFF2-40B4-BE49-F238E27FC236}">
+                <a16:creationId xmlns:a16="http://schemas.microsoft.com/office/drawing/2014/main" id="{2D365A65-B0D4-927F-DD0B-9A38190362E7}"/>
+              </a:ext>
+            </a:extLst>
+          </p:cNvPr>
+          <p:cNvSpPr txBox="1"/>
+          <p:nvPr/>
+        </p:nvSpPr>
+        <p:spPr>
+          <a:xfrm>
+            <a:off x="4188195" y="1229121"/>
+            <a:ext cx="1443024" cy="307777"/>
+          </a:xfrm>
+          <a:prstGeom prst="rect">
+            <a:avLst/>
+          </a:prstGeom>
+          <a:noFill/>
+        </p:spPr>
+        <p:txBody>
+          <a:bodyPr wrap="none" rtlCol="0">
+            <a:spAutoFit/>
+          </a:bodyPr>
+          <a:lstStyle/>
+          <a:p>
+            <a:r>
+              <a:rPr lang="en-US" sz="700" dirty="0">
+                <a:solidFill>
+                  <a:prstClr val="black"/>
+                </a:solidFill>
+                <a:latin typeface="Calibri"/>
+              </a:rPr>
+              <a:t>Request for Care Services Updates</a:t>
+            </a:r>
+          </a:p>
+          <a:p>
+            <a:r>
+              <a:rPr lang="en-US" sz="700" dirty="0">
+                <a:solidFill>
+                  <a:prstClr val="black"/>
+                </a:solidFill>
+                <a:latin typeface="Calibri"/>
+              </a:rPr>
+              <a:t>[ITI-91]</a:t>
+            </a:r>
+          </a:p>
+        </p:txBody>
+      </p:sp>
+    </p:spTree>
+    <p:extLst>
+      <p:ext uri="{BB962C8B-B14F-4D97-AF65-F5344CB8AC3E}">
+        <p14:creationId xmlns:p14="http://schemas.microsoft.com/office/powerpoint/2010/main" val="3462794841"/>
+      </p:ext>
+    </p:extLst>
+  </p:cSld>
+  <p:clrMapOvr>
+    <a:masterClrMapping/>
+  </p:clrMapOvr>
+</p:sld>
+</file>
+
 <file path=ppt/theme/theme1.xml><?xml version="1.0" encoding="utf-8"?>
 <a:theme xmlns:a="http://schemas.openxmlformats.org/drawingml/2006/main" name="1_Office Theme">
   <a:themeElements>

</xml_diff>